<commit_message>
fixed the aniong band and superscript of the RMS{\theta}
</commit_message>
<xml_diff>
--- a/Figure 4.pptx
+++ b/Figure 4.pptx
@@ -243,7 +243,7 @@
           <a:p>
             <a:fld id="{1A239F20-CC5B-49B2-A482-7CE19CFEA41F}" type="datetimeFigureOut">
               <a:rPr lang="en-US" smtClean="0"/>
-              <a:t>12/28/2025</a:t>
+              <a:t>12/29/2025</a:t>
             </a:fld>
             <a:endParaRPr lang="en-US"/>
           </a:p>
@@ -413,7 +413,7 @@
           <a:p>
             <a:fld id="{1A239F20-CC5B-49B2-A482-7CE19CFEA41F}" type="datetimeFigureOut">
               <a:rPr lang="en-US" smtClean="0"/>
-              <a:t>12/28/2025</a:t>
+              <a:t>12/29/2025</a:t>
             </a:fld>
             <a:endParaRPr lang="en-US"/>
           </a:p>
@@ -593,7 +593,7 @@
           <a:p>
             <a:fld id="{1A239F20-CC5B-49B2-A482-7CE19CFEA41F}" type="datetimeFigureOut">
               <a:rPr lang="en-US" smtClean="0"/>
-              <a:t>12/28/2025</a:t>
+              <a:t>12/29/2025</a:t>
             </a:fld>
             <a:endParaRPr lang="en-US"/>
           </a:p>
@@ -763,7 +763,7 @@
           <a:p>
             <a:fld id="{1A239F20-CC5B-49B2-A482-7CE19CFEA41F}" type="datetimeFigureOut">
               <a:rPr lang="en-US" smtClean="0"/>
-              <a:t>12/28/2025</a:t>
+              <a:t>12/29/2025</a:t>
             </a:fld>
             <a:endParaRPr lang="en-US"/>
           </a:p>
@@ -1009,7 +1009,7 @@
           <a:p>
             <a:fld id="{1A239F20-CC5B-49B2-A482-7CE19CFEA41F}" type="datetimeFigureOut">
               <a:rPr lang="en-US" smtClean="0"/>
-              <a:t>12/28/2025</a:t>
+              <a:t>12/29/2025</a:t>
             </a:fld>
             <a:endParaRPr lang="en-US"/>
           </a:p>
@@ -1241,7 +1241,7 @@
           <a:p>
             <a:fld id="{1A239F20-CC5B-49B2-A482-7CE19CFEA41F}" type="datetimeFigureOut">
               <a:rPr lang="en-US" smtClean="0"/>
-              <a:t>12/28/2025</a:t>
+              <a:t>12/29/2025</a:t>
             </a:fld>
             <a:endParaRPr lang="en-US"/>
           </a:p>
@@ -1608,7 +1608,7 @@
           <a:p>
             <a:fld id="{1A239F20-CC5B-49B2-A482-7CE19CFEA41F}" type="datetimeFigureOut">
               <a:rPr lang="en-US" smtClean="0"/>
-              <a:t>12/28/2025</a:t>
+              <a:t>12/29/2025</a:t>
             </a:fld>
             <a:endParaRPr lang="en-US"/>
           </a:p>
@@ -1726,7 +1726,7 @@
           <a:p>
             <a:fld id="{1A239F20-CC5B-49B2-A482-7CE19CFEA41F}" type="datetimeFigureOut">
               <a:rPr lang="en-US" smtClean="0"/>
-              <a:t>12/28/2025</a:t>
+              <a:t>12/29/2025</a:t>
             </a:fld>
             <a:endParaRPr lang="en-US"/>
           </a:p>
@@ -1821,7 +1821,7 @@
           <a:p>
             <a:fld id="{1A239F20-CC5B-49B2-A482-7CE19CFEA41F}" type="datetimeFigureOut">
               <a:rPr lang="en-US" smtClean="0"/>
-              <a:t>12/28/2025</a:t>
+              <a:t>12/29/2025</a:t>
             </a:fld>
             <a:endParaRPr lang="en-US"/>
           </a:p>
@@ -2098,7 +2098,7 @@
           <a:p>
             <a:fld id="{1A239F20-CC5B-49B2-A482-7CE19CFEA41F}" type="datetimeFigureOut">
               <a:rPr lang="en-US" smtClean="0"/>
-              <a:t>12/28/2025</a:t>
+              <a:t>12/29/2025</a:t>
             </a:fld>
             <a:endParaRPr lang="en-US"/>
           </a:p>
@@ -2355,7 +2355,7 @@
           <a:p>
             <a:fld id="{1A239F20-CC5B-49B2-A482-7CE19CFEA41F}" type="datetimeFigureOut">
               <a:rPr lang="en-US" smtClean="0"/>
-              <a:t>12/28/2025</a:t>
+              <a:t>12/29/2025</a:t>
             </a:fld>
             <a:endParaRPr lang="en-US"/>
           </a:p>
@@ -2568,7 +2568,7 @@
           <a:p>
             <a:fld id="{1A239F20-CC5B-49B2-A482-7CE19CFEA41F}" type="datetimeFigureOut">
               <a:rPr lang="en-US" smtClean="0"/>
-              <a:t>12/28/2025</a:t>
+              <a:t>12/29/2025</a:t>
             </a:fld>
             <a:endParaRPr lang="en-US"/>
           </a:p>

</xml_diff>